<commit_message>
Fixing the links to the Installation files.
</commit_message>
<xml_diff>
--- a/platform/documentation/src/Platform_Installation_Guide_for_Linux.pptx
+++ b/platform/documentation/src/Platform_Installation_Guide_for_Linux.pptx
@@ -9909,12 +9909,9 @@
               <a:rPr lang="en-GB" dirty="0">
                 <a:hlinkClick r:id="rId3"/>
               </a:rPr>
-              <a:t>https://sync.academiccloud.de/index.php/s/RWNxvXnELhTJNoc</a:t>
-            </a:r>
-            <a:r>
-              <a:rPr lang="en-GB" dirty="0"/>
-              <a:t> </a:t>
-            </a:r>
+              <a:t>https://sync.academiccloud.de/index.php/s/9INZ7eGe76wR8S2</a:t>
+            </a:r>
+            <a:endParaRPr lang="en-GB" dirty="0"/>
           </a:p>
           <a:p>
             <a:r>

</xml_diff>